<commit_message>
Added a references slide to the presentation
</commit_message>
<xml_diff>
--- a/Basic System Presentation - Nolan Luckett.pptx
+++ b/Basic System Presentation - Nolan Luckett.pptx
@@ -14,6 +14,7 @@
     <p:sldId id="264" r:id="rId8"/>
     <p:sldId id="261" r:id="rId9"/>
     <p:sldId id="262" r:id="rId10"/>
+    <p:sldId id="265" r:id="rId11"/>
   </p:sldIdLst>
   <p:sldSz cx="12192000" cy="6858000"/>
   <p:notesSz cx="6858000" cy="9144000"/>
@@ -125,7 +126,7 @@
   <pc:docChgLst>
     <pc:chgData name="Nolan Luckett" userId="b6d4b931108fedf9" providerId="LiveId" clId="{AF4D0585-2A01-4160-8D49-1D8B2B05CD06}"/>
     <pc:docChg chg="custSel addSld delSld modSld sldOrd">
-      <pc:chgData name="Nolan Luckett" userId="b6d4b931108fedf9" providerId="LiveId" clId="{AF4D0585-2A01-4160-8D49-1D8B2B05CD06}" dt="2018-04-05T18:30:18.954" v="2333" actId="20577"/>
+      <pc:chgData name="Nolan Luckett" userId="b6d4b931108fedf9" providerId="LiveId" clId="{AF4D0585-2A01-4160-8D49-1D8B2B05CD06}" dt="2018-04-10T18:36:55.971" v="2350" actId="1076"/>
       <pc:docMkLst>
         <pc:docMk/>
       </pc:docMkLst>
@@ -176,7 +177,7 @@
         </pc:spChg>
       </pc:sldChg>
       <pc:sldChg chg="modSp add ord">
-        <pc:chgData name="Nolan Luckett" userId="b6d4b931108fedf9" providerId="LiveId" clId="{AF4D0585-2A01-4160-8D49-1D8B2B05CD06}" dt="2018-04-05T18:27:17.486" v="1843"/>
+        <pc:chgData name="Nolan Luckett" userId="b6d4b931108fedf9" providerId="LiveId" clId="{AF4D0585-2A01-4160-8D49-1D8B2B05CD06}" dt="2018-04-05T18:27:17.486" v="1843" actId="20577"/>
         <pc:sldMkLst>
           <pc:docMk/>
           <pc:sldMk cId="431456100" sldId="260"/>
@@ -195,29 +196,6 @@
             <pc:docMk/>
             <pc:sldMk cId="431456100" sldId="260"/>
             <ac:spMk id="3" creationId="{C3B8AB9D-4357-4F92-95D4-93E74CBEA047}"/>
-          </ac:spMkLst>
-        </pc:spChg>
-      </pc:sldChg>
-      <pc:sldChg chg="modSp add del">
-        <pc:chgData name="Nolan Luckett" userId="b6d4b931108fedf9" providerId="LiveId" clId="{AF4D0585-2A01-4160-8D49-1D8B2B05CD06}" dt="2018-04-05T10:29:17.467" v="671" actId="2696"/>
-        <pc:sldMkLst>
-          <pc:docMk/>
-          <pc:sldMk cId="3007894725" sldId="260"/>
-        </pc:sldMkLst>
-        <pc:spChg chg="mod">
-          <ac:chgData name="Nolan Luckett" userId="b6d4b931108fedf9" providerId="LiveId" clId="{AF4D0585-2A01-4160-8D49-1D8B2B05CD06}" dt="2018-04-05T10:23:31.031" v="386" actId="20577"/>
-          <ac:spMkLst>
-            <pc:docMk/>
-            <pc:sldMk cId="3007894725" sldId="260"/>
-            <ac:spMk id="2" creationId="{868E242B-8159-4349-BAE4-EC88AA3C613B}"/>
-          </ac:spMkLst>
-        </pc:spChg>
-        <pc:spChg chg="mod">
-          <ac:chgData name="Nolan Luckett" userId="b6d4b931108fedf9" providerId="LiveId" clId="{AF4D0585-2A01-4160-8D49-1D8B2B05CD06}" dt="2018-04-05T10:27:30.460" v="670" actId="20577"/>
-          <ac:spMkLst>
-            <pc:docMk/>
-            <pc:sldMk cId="3007894725" sldId="260"/>
-            <ac:spMk id="3" creationId="{A8F35185-BA7A-4B38-96D9-CEDFA8D92836}"/>
           </ac:spMkLst>
         </pc:spChg>
       </pc:sldChg>
@@ -313,6 +291,37 @@
           </ac:spMkLst>
         </pc:spChg>
       </pc:sldChg>
+      <pc:sldChg chg="addSp modSp add">
+        <pc:chgData name="Nolan Luckett" userId="b6d4b931108fedf9" providerId="LiveId" clId="{AF4D0585-2A01-4160-8D49-1D8B2B05CD06}" dt="2018-04-10T18:36:55.971" v="2350" actId="1076"/>
+        <pc:sldMkLst>
+          <pc:docMk/>
+          <pc:sldMk cId="1805147371" sldId="265"/>
+        </pc:sldMkLst>
+        <pc:spChg chg="mod">
+          <ac:chgData name="Nolan Luckett" userId="b6d4b931108fedf9" providerId="LiveId" clId="{AF4D0585-2A01-4160-8D49-1D8B2B05CD06}" dt="2018-04-10T18:34:59.910" v="2344" actId="20577"/>
+          <ac:spMkLst>
+            <pc:docMk/>
+            <pc:sldMk cId="1805147371" sldId="265"/>
+            <ac:spMk id="2" creationId="{10B19F00-96CB-49CE-AE0A-628C254AEE5A}"/>
+          </ac:spMkLst>
+        </pc:spChg>
+        <pc:spChg chg="mod">
+          <ac:chgData name="Nolan Luckett" userId="b6d4b931108fedf9" providerId="LiveId" clId="{AF4D0585-2A01-4160-8D49-1D8B2B05CD06}" dt="2018-04-10T18:36:51.898" v="2349" actId="14100"/>
+          <ac:spMkLst>
+            <pc:docMk/>
+            <pc:sldMk cId="1805147371" sldId="265"/>
+            <ac:spMk id="3" creationId="{FAFAB324-8C77-47C4-BDC5-39D4AFD35F21}"/>
+          </ac:spMkLst>
+        </pc:spChg>
+        <pc:graphicFrameChg chg="add mod">
+          <ac:chgData name="Nolan Luckett" userId="b6d4b931108fedf9" providerId="LiveId" clId="{AF4D0585-2A01-4160-8D49-1D8B2B05CD06}" dt="2018-04-10T18:36:55.971" v="2350" actId="1076"/>
+          <ac:graphicFrameMkLst>
+            <pc:docMk/>
+            <pc:sldMk cId="1805147371" sldId="265"/>
+            <ac:graphicFrameMk id="4" creationId="{58D32EFD-9333-4A17-B396-0C32A5E375E3}"/>
+          </ac:graphicFrameMkLst>
+        </pc:graphicFrameChg>
+      </pc:sldChg>
     </pc:docChg>
   </pc:docChgLst>
 </pc:chgInfo>
@@ -510,7 +519,7 @@
             <a:fld id="{B61BEF0D-F0BB-DE4B-95CE-6DB70DBA9567}" type="datetimeFigureOut">
               <a:rPr lang="en-US" dirty="0"/>
               <a:pPr/>
-              <a:t>4/5/2018</a:t>
+              <a:t>4/10/2018</a:t>
             </a:fld>
             <a:endParaRPr lang="en-US" dirty="0"/>
           </a:p>
@@ -943,7 +952,7 @@
             <a:fld id="{B61BEF0D-F0BB-DE4B-95CE-6DB70DBA9567}" type="datetimeFigureOut">
               <a:rPr lang="en-US" dirty="0"/>
               <a:pPr/>
-              <a:t>4/5/2018</a:t>
+              <a:t>4/10/2018</a:t>
             </a:fld>
             <a:endParaRPr lang="en-US" dirty="0"/>
           </a:p>
@@ -1190,7 +1199,7 @@
             <a:fld id="{B61BEF0D-F0BB-DE4B-95CE-6DB70DBA9567}" type="datetimeFigureOut">
               <a:rPr lang="en-US" dirty="0"/>
               <a:pPr/>
-              <a:t>4/5/2018</a:t>
+              <a:t>4/10/2018</a:t>
             </a:fld>
             <a:endParaRPr lang="en-US" dirty="0"/>
           </a:p>
@@ -1495,7 +1504,7 @@
             <a:fld id="{B61BEF0D-F0BB-DE4B-95CE-6DB70DBA9567}" type="datetimeFigureOut">
               <a:rPr lang="en-US" dirty="0"/>
               <a:pPr/>
-              <a:t>4/5/2018</a:t>
+              <a:t>4/10/2018</a:t>
             </a:fld>
             <a:endParaRPr lang="en-US" dirty="0"/>
           </a:p>
@@ -1810,7 +1819,7 @@
             <a:fld id="{B61BEF0D-F0BB-DE4B-95CE-6DB70DBA9567}" type="datetimeFigureOut">
               <a:rPr lang="en-US" dirty="0"/>
               <a:pPr/>
-              <a:t>4/5/2018</a:t>
+              <a:t>4/10/2018</a:t>
             </a:fld>
             <a:endParaRPr lang="en-US" dirty="0"/>
           </a:p>
@@ -2109,7 +2118,7 @@
             <a:fld id="{B61BEF0D-F0BB-DE4B-95CE-6DB70DBA9567}" type="datetimeFigureOut">
               <a:rPr lang="en-US" dirty="0"/>
               <a:pPr/>
-              <a:t>4/5/2018</a:t>
+              <a:t>4/10/2018</a:t>
             </a:fld>
             <a:endParaRPr lang="en-US" dirty="0"/>
           </a:p>
@@ -2473,7 +2482,7 @@
             <a:fld id="{B61BEF0D-F0BB-DE4B-95CE-6DB70DBA9567}" type="datetimeFigureOut">
               <a:rPr lang="en-US" dirty="0"/>
               <a:pPr/>
-              <a:t>4/5/2018</a:t>
+              <a:t>4/10/2018</a:t>
             </a:fld>
             <a:endParaRPr lang="en-US" dirty="0"/>
           </a:p>
@@ -2644,7 +2653,7 @@
             <a:fld id="{B61BEF0D-F0BB-DE4B-95CE-6DB70DBA9567}" type="datetimeFigureOut">
               <a:rPr lang="en-US" dirty="0"/>
               <a:pPr/>
-              <a:t>4/5/2018</a:t>
+              <a:t>4/10/2018</a:t>
             </a:fld>
             <a:endParaRPr lang="en-US" dirty="0"/>
           </a:p>
@@ -2821,7 +2830,7 @@
             <a:fld id="{B61BEF0D-F0BB-DE4B-95CE-6DB70DBA9567}" type="datetimeFigureOut">
               <a:rPr lang="en-US" dirty="0"/>
               <a:pPr/>
-              <a:t>4/5/2018</a:t>
+              <a:t>4/10/2018</a:t>
             </a:fld>
             <a:endParaRPr lang="en-US" dirty="0"/>
           </a:p>
@@ -2988,7 +2997,7 @@
             <a:fld id="{B61BEF0D-F0BB-DE4B-95CE-6DB70DBA9567}" type="datetimeFigureOut">
               <a:rPr lang="en-US" dirty="0"/>
               <a:pPr/>
-              <a:t>4/5/2018</a:t>
+              <a:t>4/10/2018</a:t>
             </a:fld>
             <a:endParaRPr lang="en-US" dirty="0"/>
           </a:p>
@@ -3235,7 +3244,7 @@
             <a:fld id="{B61BEF0D-F0BB-DE4B-95CE-6DB70DBA9567}" type="datetimeFigureOut">
               <a:rPr lang="en-US" dirty="0"/>
               <a:pPr/>
-              <a:t>4/5/2018</a:t>
+              <a:t>4/10/2018</a:t>
             </a:fld>
             <a:endParaRPr lang="en-US" dirty="0"/>
           </a:p>
@@ -3468,7 +3477,7 @@
             <a:fld id="{B61BEF0D-F0BB-DE4B-95CE-6DB70DBA9567}" type="datetimeFigureOut">
               <a:rPr lang="en-US" dirty="0"/>
               <a:pPr/>
-              <a:t>4/5/2018</a:t>
+              <a:t>4/10/2018</a:t>
             </a:fld>
             <a:endParaRPr lang="en-US" dirty="0"/>
           </a:p>
@@ -3847,7 +3856,7 @@
             <a:fld id="{B61BEF0D-F0BB-DE4B-95CE-6DB70DBA9567}" type="datetimeFigureOut">
               <a:rPr lang="en-US" dirty="0"/>
               <a:pPr/>
-              <a:t>4/5/2018</a:t>
+              <a:t>4/10/2018</a:t>
             </a:fld>
             <a:endParaRPr lang="en-US" dirty="0"/>
           </a:p>
@@ -3962,7 +3971,7 @@
             <a:fld id="{B61BEF0D-F0BB-DE4B-95CE-6DB70DBA9567}" type="datetimeFigureOut">
               <a:rPr lang="en-US" dirty="0"/>
               <a:pPr/>
-              <a:t>4/5/2018</a:t>
+              <a:t>4/10/2018</a:t>
             </a:fld>
             <a:endParaRPr lang="en-US" dirty="0"/>
           </a:p>
@@ -4054,7 +4063,7 @@
             <a:fld id="{B61BEF0D-F0BB-DE4B-95CE-6DB70DBA9567}" type="datetimeFigureOut">
               <a:rPr lang="en-US" dirty="0"/>
               <a:pPr/>
-              <a:t>4/5/2018</a:t>
+              <a:t>4/10/2018</a:t>
             </a:fld>
             <a:endParaRPr lang="en-US" dirty="0"/>
           </a:p>
@@ -4306,7 +4315,7 @@
             <a:fld id="{B61BEF0D-F0BB-DE4B-95CE-6DB70DBA9567}" type="datetimeFigureOut">
               <a:rPr lang="en-US" dirty="0"/>
               <a:pPr/>
-              <a:t>4/5/2018</a:t>
+              <a:t>4/10/2018</a:t>
             </a:fld>
             <a:endParaRPr lang="en-US" dirty="0"/>
           </a:p>
@@ -4586,7 +4595,7 @@
             <a:fld id="{B61BEF0D-F0BB-DE4B-95CE-6DB70DBA9567}" type="datetimeFigureOut">
               <a:rPr lang="en-US" dirty="0"/>
               <a:pPr/>
-              <a:t>4/5/2018</a:t>
+              <a:t>4/10/2018</a:t>
             </a:fld>
             <a:endParaRPr lang="en-US" dirty="0"/>
           </a:p>
@@ -4989,7 +4998,7 @@
             <a:fld id="{B61BEF0D-F0BB-DE4B-95CE-6DB70DBA9567}" type="datetimeFigureOut">
               <a:rPr lang="en-US" dirty="0"/>
               <a:pPr/>
-              <a:t>4/5/2018</a:t>
+              <a:t>4/10/2018</a:t>
             </a:fld>
             <a:endParaRPr lang="en-US" dirty="0"/>
           </a:p>
@@ -5595,6 +5604,172 @@
 </p:sld>
 </file>
 
+<file path=ppt/slides/slide10.xml><?xml version="1.0" encoding="utf-8"?>
+<p:sld xmlns:a="http://schemas.openxmlformats.org/drawingml/2006/main" xmlns:r="http://schemas.openxmlformats.org/officeDocument/2006/relationships" xmlns:p="http://schemas.openxmlformats.org/presentationml/2006/main">
+  <p:cSld>
+    <p:spTree>
+      <p:nvGrpSpPr>
+        <p:cNvPr id="1" name=""/>
+        <p:cNvGrpSpPr/>
+        <p:nvPr/>
+      </p:nvGrpSpPr>
+      <p:grpSpPr>
+        <a:xfrm>
+          <a:off x="0" y="0"/>
+          <a:ext cx="0" cy="0"/>
+          <a:chOff x="0" y="0"/>
+          <a:chExt cx="0" cy="0"/>
+        </a:xfrm>
+      </p:grpSpPr>
+      <p:sp>
+        <p:nvSpPr>
+          <p:cNvPr id="2" name="Title 1">
+            <a:extLst>
+              <a:ext uri="{FF2B5EF4-FFF2-40B4-BE49-F238E27FC236}">
+                <a16:creationId xmlns:a16="http://schemas.microsoft.com/office/drawing/2014/main" id="{10B19F00-96CB-49CE-AE0A-628C254AEE5A}"/>
+              </a:ext>
+            </a:extLst>
+          </p:cNvPr>
+          <p:cNvSpPr>
+            <a:spLocks noGrp="1"/>
+          </p:cNvSpPr>
+          <p:nvPr>
+            <p:ph type="title"/>
+          </p:nvPr>
+        </p:nvSpPr>
+        <p:spPr/>
+        <p:txBody>
+          <a:bodyPr/>
+          <a:lstStyle/>
+          <a:p>
+            <a:r>
+              <a:rPr lang="en-US" dirty="0"/>
+              <a:t>References</a:t>
+            </a:r>
+          </a:p>
+        </p:txBody>
+      </p:sp>
+      <p:sp>
+        <p:nvSpPr>
+          <p:cNvPr id="3" name="Content Placeholder 2">
+            <a:extLst>
+              <a:ext uri="{FF2B5EF4-FFF2-40B4-BE49-F238E27FC236}">
+                <a16:creationId xmlns:a16="http://schemas.microsoft.com/office/drawing/2014/main" id="{FAFAB324-8C77-47C4-BDC5-39D4AFD35F21}"/>
+              </a:ext>
+            </a:extLst>
+          </p:cNvPr>
+          <p:cNvSpPr>
+            <a:spLocks noGrp="1"/>
+          </p:cNvSpPr>
+          <p:nvPr>
+            <p:ph idx="1"/>
+          </p:nvPr>
+        </p:nvSpPr>
+        <p:spPr>
+          <a:xfrm>
+            <a:off x="684212" y="685800"/>
+            <a:ext cx="5464588" cy="3615267"/>
+          </a:xfrm>
+        </p:spPr>
+        <p:txBody>
+          <a:bodyPr/>
+          <a:lstStyle/>
+          <a:p>
+            <a:r>
+              <a:rPr lang="en-US" u="sng" dirty="0">
+                <a:hlinkClick r:id="rId3"/>
+              </a:rPr>
+              <a:t>https://reference.digilentinc.com/reference/programmable-logic/zybo/reference-manual</a:t>
+            </a:r>
+            <a:endParaRPr lang="en-US" dirty="0"/>
+          </a:p>
+          <a:p>
+            <a:endParaRPr lang="en-US" dirty="0"/>
+          </a:p>
+        </p:txBody>
+      </p:sp>
+      <p:graphicFrame>
+        <p:nvGraphicFramePr>
+          <p:cNvPr id="4" name="Object 3">
+            <a:extLst>
+              <a:ext uri="{FF2B5EF4-FFF2-40B4-BE49-F238E27FC236}">
+                <a16:creationId xmlns:a16="http://schemas.microsoft.com/office/drawing/2014/main" id="{58D32EFD-9333-4A17-B396-0C32A5E375E3}"/>
+              </a:ext>
+            </a:extLst>
+          </p:cNvPr>
+          <p:cNvGraphicFramePr>
+            <a:graphicFrameLocks noChangeAspect="1"/>
+          </p:cNvGraphicFramePr>
+          <p:nvPr>
+            <p:extLst>
+              <p:ext uri="{D42A27DB-BD31-4B8C-83A1-F6EECF244321}">
+                <p14:modId xmlns:p14="http://schemas.microsoft.com/office/powerpoint/2010/main" val="4249633509"/>
+              </p:ext>
+            </p:extLst>
+          </p:nvPr>
+        </p:nvGraphicFramePr>
+        <p:xfrm>
+          <a:off x="8269288" y="685800"/>
+          <a:ext cx="3238500" cy="4583113"/>
+        </p:xfrm>
+        <a:graphic>
+          <a:graphicData uri="http://schemas.openxmlformats.org/presentationml/2006/ole">
+            <mc:AlternateContent xmlns:mc="http://schemas.openxmlformats.org/markup-compatibility/2006">
+              <mc:Choice xmlns:v="urn:schemas-microsoft-com:vml" Requires="v">
+                <p:oleObj spid="_x0000_s1026" name="Acrobat Document" r:id="rId4" imgW="3238149" imgH="4582512" progId="AcroExch.Document.11">
+                  <p:embed/>
+                </p:oleObj>
+              </mc:Choice>
+              <mc:Fallback>
+                <p:oleObj name="Acrobat Document" r:id="rId4" imgW="3238149" imgH="4582512" progId="AcroExch.Document.11">
+                  <p:embed/>
+                  <p:pic>
+                    <p:nvPicPr>
+                      <p:cNvPr id="4" name="Object 3">
+                        <a:extLst>
+                          <a:ext uri="{FF2B5EF4-FFF2-40B4-BE49-F238E27FC236}">
+                            <a16:creationId xmlns:a16="http://schemas.microsoft.com/office/drawing/2014/main" id="{58D32EFD-9333-4A17-B396-0C32A5E375E3}"/>
+                          </a:ext>
+                        </a:extLst>
+                      </p:cNvPr>
+                      <p:cNvPicPr/>
+                      <p:nvPr/>
+                    </p:nvPicPr>
+                    <p:blipFill>
+                      <a:blip r:embed="rId5"/>
+                      <a:stretch>
+                        <a:fillRect/>
+                      </a:stretch>
+                    </p:blipFill>
+                    <p:spPr>
+                      <a:xfrm>
+                        <a:off x="8269288" y="685800"/>
+                        <a:ext cx="3238500" cy="4583113"/>
+                      </a:xfrm>
+                      <a:prstGeom prst="rect">
+                        <a:avLst/>
+                      </a:prstGeom>
+                    </p:spPr>
+                  </p:pic>
+                </p:oleObj>
+              </mc:Fallback>
+            </mc:AlternateContent>
+          </a:graphicData>
+        </a:graphic>
+      </p:graphicFrame>
+    </p:spTree>
+    <p:extLst>
+      <p:ext uri="{BB962C8B-B14F-4D97-AF65-F5344CB8AC3E}">
+        <p14:creationId xmlns:p14="http://schemas.microsoft.com/office/powerpoint/2010/main" val="1805147371"/>
+      </p:ext>
+    </p:extLst>
+  </p:cSld>
+  <p:clrMapOvr>
+    <a:masterClrMapping/>
+  </p:clrMapOvr>
+</p:sld>
+</file>
+
 <file path=ppt/slides/slide2.xml><?xml version="1.0" encoding="utf-8"?>
 <p:sld xmlns:a="http://schemas.openxmlformats.org/drawingml/2006/main" xmlns:r="http://schemas.openxmlformats.org/officeDocument/2006/relationships" xmlns:p="http://schemas.openxmlformats.org/presentationml/2006/main">
   <p:cSld>

</xml_diff>